<commit_message>
Fix for ACS to AAD content
</commit_message>
<xml_diff>
--- a/presentations/From-ACS-to-AAD-apps.pptx
+++ b/presentations/From-ACS-to-AAD-apps.pptx
@@ -259,7 +259,7 @@
               <a:rPr lang="en-US" smtClean="0">
                 <a:latin typeface="Segoe UI" pitchFamily="34" charset="0"/>
               </a:rPr>
-              <a:t>3/3/2023 3:53 PM</a:t>
+              <a:t>3/14/2023 3:18 PM</a:t>
             </a:fld>
             <a:endParaRPr lang="en-US">
               <a:latin typeface="Segoe UI" pitchFamily="34" charset="0"/>
@@ -537,7 +537,7 @@
           <a:p>
             <a:fld id="{D18B56EA-E28F-4F92-9F16-7A6F2501B303}" type="datetime8">
               <a:rPr lang="en-US" smtClean="0"/>
-              <a:t>3/3/2023 3:53 PM</a:t>
+              <a:t>3/14/2023 3:18 PM</a:t>
             </a:fld>
             <a:endParaRPr lang="en-US"/>
           </a:p>
@@ -1076,7 +1076,7 @@
           <a:p>
             <a:fld id="{D18B56EA-E28F-4F92-9F16-7A6F2501B303}" type="datetime8">
               <a:rPr lang="en-US" smtClean="0"/>
-              <a:t>3/3/2023 3:53 PM</a:t>
+              <a:t>3/14/2023 3:18 PM</a:t>
             </a:fld>
             <a:endParaRPr lang="en-US"/>
           </a:p>
@@ -14390,7 +14390,7 @@
         </p:spPr>
         <p:txBody>
           <a:bodyPr>
-            <a:normAutofit lnSpcReduction="10000"/>
+            <a:normAutofit/>
           </a:bodyPr>
           <a:lstStyle/>
           <a:p>
@@ -14421,18 +14421,15 @@
             <a:pPr lvl="2"/>
             <a:r>
               <a:rPr lang="en-US" sz="1200" dirty="0"/>
-              <a:t>Still available for SharePoint Online, but still an old service</a:t>
-            </a:r>
-          </a:p>
-          <a:p>
-            <a:pPr lvl="1"/>
-            <a:r>
-              <a:rPr lang="en-US" sz="1400" dirty="0"/>
-              <a:t>What if you want to target multiple tenants? </a:t>
-            </a:r>
-          </a:p>
-          <a:p>
-            <a:pPr lvl="1"/>
+              <a:t>Still available for SharePoint Online, but still an </a:t>
+            </a:r>
+            <a:r>
+              <a:rPr lang="en-US" sz="1200"/>
+              <a:t>old service</a:t>
+            </a:r>
+          </a:p>
+          <a:p>
+            <a:pPr lvl="2"/>
             <a:endParaRPr lang="en-US" sz="1400" dirty="0"/>
           </a:p>
           <a:p>
@@ -16000,12 +15997,15 @@
 </file>
 
 <file path=customXml/item1.xml><?xml version="1.0" encoding="utf-8"?>
-<?mso-contentType ?>
-<FormTemplates xmlns="http://schemas.microsoft.com/sharepoint/v3/contenttype/forms">
-  <Display>DocumentLibraryForm</Display>
-  <Edit>DocumentLibraryForm</Edit>
-  <New>DocumentLibraryForm</New>
-</FormTemplates>
+<p:properties xmlns:p="http://schemas.microsoft.com/office/2006/metadata/properties" xmlns:xsi="http://www.w3.org/2001/XMLSchema-instance" xmlns:pc="http://schemas.microsoft.com/office/infopath/2007/PartnerControls">
+  <documentManagement>
+    <MediaServiceKeyPoints xmlns="ed971524-76e7-40a8-a01a-f99956bd178c" xsi:nil="true"/>
+    <lcf76f155ced4ddcb4097134ff3c332f xmlns="ed971524-76e7-40a8-a01a-f99956bd178c">
+      <Terms xmlns="http://schemas.microsoft.com/office/infopath/2007/PartnerControls"/>
+    </lcf76f155ced4ddcb4097134ff3c332f>
+    <TaxCatchAll xmlns="230e9df3-be65-4c73-a93b-d1236ebd677e" xsi:nil="true"/>
+  </documentManagement>
+</p:properties>
 </file>
 
 <file path=customXml/item2.xml><?xml version="1.0" encoding="utf-8"?>
@@ -16251,21 +16251,28 @@
 </file>
 
 <file path=customXml/item3.xml><?xml version="1.0" encoding="utf-8"?>
-<p:properties xmlns:p="http://schemas.microsoft.com/office/2006/metadata/properties" xmlns:xsi="http://www.w3.org/2001/XMLSchema-instance" xmlns:pc="http://schemas.microsoft.com/office/infopath/2007/PartnerControls">
-  <documentManagement>
-    <MediaServiceKeyPoints xmlns="ed971524-76e7-40a8-a01a-f99956bd178c" xsi:nil="true"/>
-    <lcf76f155ced4ddcb4097134ff3c332f xmlns="ed971524-76e7-40a8-a01a-f99956bd178c">
-      <Terms xmlns="http://schemas.microsoft.com/office/infopath/2007/PartnerControls"/>
-    </lcf76f155ced4ddcb4097134ff3c332f>
-    <TaxCatchAll xmlns="230e9df3-be65-4c73-a93b-d1236ebd677e" xsi:nil="true"/>
-  </documentManagement>
-</p:properties>
+<?mso-contentType ?>
+<FormTemplates xmlns="http://schemas.microsoft.com/sharepoint/v3/contenttype/forms">
+  <Display>DocumentLibraryForm</Display>
+  <Edit>DocumentLibraryForm</Edit>
+  <New>DocumentLibraryForm</New>
+</FormTemplates>
 </file>
 
 <file path=customXml/itemProps1.xml><?xml version="1.0" encoding="utf-8"?>
-<ds:datastoreItem xmlns:ds="http://schemas.openxmlformats.org/officeDocument/2006/customXml" ds:itemID="{758FDAC0-319D-4A54-8D8E-1D42CB1F8004}">
+<ds:datastoreItem xmlns:ds="http://schemas.openxmlformats.org/officeDocument/2006/customXml" ds:itemID="{F990F116-B58F-4255-B05B-DA3808E0E5C6}">
   <ds:schemaRefs>
-    <ds:schemaRef ds:uri="http://schemas.microsoft.com/sharepoint/v3/contenttype/forms"/>
+    <ds:schemaRef ds:uri="http://purl.org/dc/dcmitype/"/>
+    <ds:schemaRef ds:uri="http://schemas.microsoft.com/office/2006/metadata/properties"/>
+    <ds:schemaRef ds:uri="b0e4521d-181b-4aee-b4a8-952b2bc14729"/>
+    <ds:schemaRef ds:uri="http://www.w3.org/XML/1998/namespace"/>
+    <ds:schemaRef ds:uri="http://purl.org/dc/terms/"/>
+    <ds:schemaRef ds:uri="http://schemas.microsoft.com/office/2006/documentManagement/types"/>
+    <ds:schemaRef ds:uri="http://purl.org/dc/elements/1.1/"/>
+    <ds:schemaRef ds:uri="230e9df3-be65-4c73-a93b-d1236ebd677e"/>
+    <ds:schemaRef ds:uri="http://schemas.microsoft.com/office/infopath/2007/PartnerControls"/>
+    <ds:schemaRef ds:uri="http://schemas.openxmlformats.org/package/2006/metadata/core-properties"/>
+    <ds:schemaRef ds:uri="ed971524-76e7-40a8-a01a-f99956bd178c"/>
   </ds:schemaRefs>
 </ds:datastoreItem>
 </file>
@@ -16291,19 +16298,9 @@
 </file>
 
 <file path=customXml/itemProps3.xml><?xml version="1.0" encoding="utf-8"?>
-<ds:datastoreItem xmlns:ds="http://schemas.openxmlformats.org/officeDocument/2006/customXml" ds:itemID="{F990F116-B58F-4255-B05B-DA3808E0E5C6}">
+<ds:datastoreItem xmlns:ds="http://schemas.openxmlformats.org/officeDocument/2006/customXml" ds:itemID="{758FDAC0-319D-4A54-8D8E-1D42CB1F8004}">
   <ds:schemaRefs>
-    <ds:schemaRef ds:uri="http://purl.org/dc/dcmitype/"/>
-    <ds:schemaRef ds:uri="http://schemas.microsoft.com/office/2006/metadata/properties"/>
-    <ds:schemaRef ds:uri="b0e4521d-181b-4aee-b4a8-952b2bc14729"/>
-    <ds:schemaRef ds:uri="http://www.w3.org/XML/1998/namespace"/>
-    <ds:schemaRef ds:uri="http://purl.org/dc/terms/"/>
-    <ds:schemaRef ds:uri="http://schemas.microsoft.com/office/2006/documentManagement/types"/>
-    <ds:schemaRef ds:uri="http://purl.org/dc/elements/1.1/"/>
-    <ds:schemaRef ds:uri="230e9df3-be65-4c73-a93b-d1236ebd677e"/>
-    <ds:schemaRef ds:uri="http://schemas.microsoft.com/office/infopath/2007/PartnerControls"/>
-    <ds:schemaRef ds:uri="http://schemas.openxmlformats.org/package/2006/metadata/core-properties"/>
-    <ds:schemaRef ds:uri="ed971524-76e7-40a8-a01a-f99956bd178c"/>
+    <ds:schemaRef ds:uri="http://schemas.microsoft.com/sharepoint/v3/contenttype/forms"/>
   </ds:schemaRefs>
 </ds:datastoreItem>
 </file>

</xml_diff>